<commit_message>
animacia playera, obrazok sa zatial nehýbe#9
</commit_message>
<xml_diff>
--- a/GAME.pptx
+++ b/GAME.pptx
@@ -5,17 +5,15 @@
     <p:sldMasterId id="2147483705" r:id="rId1"/>
   </p:sldMasterIdLst>
   <p:notesMasterIdLst>
-    <p:notesMasterId r:id="rId7"/>
+    <p:notesMasterId r:id="rId5"/>
   </p:notesMasterIdLst>
   <p:handoutMasterIdLst>
-    <p:handoutMasterId r:id="rId8"/>
+    <p:handoutMasterId r:id="rId6"/>
   </p:handoutMasterIdLst>
   <p:sldIdLst>
     <p:sldId id="259" r:id="rId2"/>
-    <p:sldId id="261" r:id="rId3"/>
-    <p:sldId id="263" r:id="rId4"/>
-    <p:sldId id="264" r:id="rId5"/>
-    <p:sldId id="265" r:id="rId6"/>
+    <p:sldId id="263" r:id="rId3"/>
+    <p:sldId id="264" r:id="rId4"/>
   </p:sldIdLst>
   <p:sldSz cx="12192000" cy="6858000"/>
   <p:notesSz cx="6858000" cy="9144000"/>
@@ -209,7 +207,7 @@
             <a:pPr rtl="0"/>
             <a:fld id="{DD997B62-B035-4635-96E6-05C62408EC0C}" type="datetime1">
               <a:rPr lang="sk-SK" smtClean="0"/>
-              <a:t>5. 5. 2023</a:t>
+              <a:t>12. 5. 2023</a:t>
             </a:fld>
             <a:endParaRPr lang="en-US" dirty="0"/>
           </a:p>
@@ -379,7 +377,7 @@
             <a:pPr rtl="0"/>
             <a:fld id="{8F88E954-5F59-47BF-AD52-9EB951631C22}" type="datetime1">
               <a:rPr lang="sk-SK" smtClean="0"/>
-              <a:t>5. 5. 2023</a:t>
+              <a:t>12. 5. 2023</a:t>
             </a:fld>
             <a:endParaRPr lang="en-US"/>
           </a:p>
@@ -840,7 +838,7 @@
             <a:pPr rtl="0"/>
             <a:fld id="{ACDD93C0-0FC6-420B-8464-0E1BE32773B3}" type="datetime1">
               <a:rPr lang="sk-SK" smtClean="0"/>
-              <a:t>5. 5. 2023</a:t>
+              <a:t>12. 5. 2023</a:t>
             </a:fld>
             <a:endParaRPr lang="en-US" dirty="0"/>
           </a:p>
@@ -1150,7 +1148,7 @@
             <a:pPr rtl="0"/>
             <a:fld id="{7FC96BF9-84BF-4A42-93A5-7A5549798115}" type="datetime1">
               <a:rPr lang="sk-SK" smtClean="0"/>
-              <a:t>5. 5. 2023</a:t>
+              <a:t>12. 5. 2023</a:t>
             </a:fld>
             <a:endParaRPr lang="en-US" dirty="0"/>
           </a:p>
@@ -1348,7 +1346,7 @@
             <a:pPr rtl="0"/>
             <a:fld id="{914D2DEA-9F31-4571-87F5-FD2A17D24737}" type="datetime1">
               <a:rPr lang="sk-SK" smtClean="0"/>
-              <a:t>5. 5. 2023</a:t>
+              <a:t>12. 5. 2023</a:t>
             </a:fld>
             <a:endParaRPr lang="en-US" dirty="0"/>
           </a:p>
@@ -1615,7 +1613,7 @@
             <a:pPr rtl="0"/>
             <a:fld id="{BFF23983-B057-4AF6-9AD0-44F76763EC80}" type="datetime1">
               <a:rPr lang="sk-SK" smtClean="0"/>
-              <a:t>5. 5. 2023</a:t>
+              <a:t>12. 5. 2023</a:t>
             </a:fld>
             <a:endParaRPr lang="en-US" dirty="0"/>
           </a:p>
@@ -2055,7 +2053,7 @@
             <a:pPr rtl="0"/>
             <a:fld id="{4D54E0FE-DD4C-4FF6-AFE1-F0153730C04B}" type="datetime1">
               <a:rPr lang="sk-SK" smtClean="0"/>
-              <a:t>5. 5. 2023</a:t>
+              <a:t>12. 5. 2023</a:t>
             </a:fld>
             <a:endParaRPr lang="en-US" dirty="0"/>
           </a:p>
@@ -2604,7 +2602,7 @@
             <a:pPr rtl="0"/>
             <a:fld id="{AF3125DB-5B4F-4EE6-B1B6-59F16000097E}" type="datetime1">
               <a:rPr lang="sk-SK" smtClean="0"/>
-              <a:t>5. 5. 2023</a:t>
+              <a:t>12. 5. 2023</a:t>
             </a:fld>
             <a:endParaRPr lang="en-US" dirty="0"/>
           </a:p>
@@ -3513,7 +3511,7 @@
             <a:pPr rtl="0"/>
             <a:fld id="{FFDC2782-4086-4041-A597-92F5D1E2D96B}" type="datetime1">
               <a:rPr lang="sk-SK" smtClean="0"/>
-              <a:t>5. 5. 2023</a:t>
+              <a:t>12. 5. 2023</a:t>
             </a:fld>
             <a:endParaRPr lang="en-US" dirty="0"/>
           </a:p>
@@ -3687,7 +3685,7 @@
             <a:pPr rtl="0"/>
             <a:fld id="{F509BE4F-DCCD-4D31-9C2F-CEE581DCF0D6}" type="datetime1">
               <a:rPr lang="sk-SK" smtClean="0"/>
-              <a:t>5. 5. 2023</a:t>
+              <a:t>12. 5. 2023</a:t>
             </a:fld>
             <a:endParaRPr lang="en-US" dirty="0"/>
           </a:p>
@@ -3875,7 +3873,7 @@
             <a:pPr rtl="0"/>
             <a:fld id="{CFD4BAF0-4A88-46D7-A4F6-6EFE5BC96F4C}" type="datetime1">
               <a:rPr lang="sk-SK" smtClean="0"/>
-              <a:t>5. 5. 2023</a:t>
+              <a:t>12. 5. 2023</a:t>
             </a:fld>
             <a:endParaRPr lang="en-US" dirty="0"/>
           </a:p>
@@ -4057,7 +4055,7 @@
             <a:pPr rtl="0"/>
             <a:fld id="{D3046F11-C154-4DFF-AB72-5BD2314E7A83}" type="datetime1">
               <a:rPr lang="sk-SK" smtClean="0"/>
-              <a:t>5. 5. 2023</a:t>
+              <a:t>12. 5. 2023</a:t>
             </a:fld>
             <a:endParaRPr lang="en-US" dirty="0"/>
           </a:p>
@@ -4305,7 +4303,7 @@
             <a:pPr rtl="0"/>
             <a:fld id="{D2C3B6CE-734B-44E7-82BD-E1471C9818D6}" type="datetime1">
               <a:rPr lang="sk-SK" smtClean="0"/>
-              <a:t>5. 5. 2023</a:t>
+              <a:t>12. 5. 2023</a:t>
             </a:fld>
             <a:endParaRPr lang="en-US" dirty="0"/>
           </a:p>
@@ -4559,7 +4557,7 @@
             <a:pPr rtl="0"/>
             <a:fld id="{4666FD77-AF9F-4A35-8C7E-8816FA2C7476}" type="datetime1">
               <a:rPr lang="sk-SK" smtClean="0"/>
-              <a:t>5. 5. 2023</a:t>
+              <a:t>12. 5. 2023</a:t>
             </a:fld>
             <a:endParaRPr lang="en-US" dirty="0"/>
           </a:p>
@@ -5054,7 +5052,7 @@
             <a:pPr rtl="0"/>
             <a:fld id="{6E99163E-FC86-4DD8-A6C9-05392E4121F2}" type="datetime1">
               <a:rPr lang="sk-SK" smtClean="0"/>
-              <a:t>5. 5. 2023</a:t>
+              <a:t>12. 5. 2023</a:t>
             </a:fld>
             <a:endParaRPr lang="en-US" dirty="0"/>
           </a:p>
@@ -5184,7 +5182,7 @@
             <a:pPr rtl="0"/>
             <a:fld id="{18F5519E-2A47-4ED0-9B49-976F152F62EA}" type="datetime1">
               <a:rPr lang="sk-SK" smtClean="0"/>
-              <a:t>5. 5. 2023</a:t>
+              <a:t>12. 5. 2023</a:t>
             </a:fld>
             <a:endParaRPr lang="en-US" dirty="0"/>
           </a:p>
@@ -5282,7 +5280,7 @@
             <a:pPr rtl="0"/>
             <a:fld id="{84B31964-DE81-464E-B3D4-76A9F609FDCB}" type="datetime1">
               <a:rPr lang="sk-SK" smtClean="0"/>
-              <a:t>5. 5. 2023</a:t>
+              <a:t>12. 5. 2023</a:t>
             </a:fld>
             <a:endParaRPr lang="en-US" dirty="0"/>
           </a:p>
@@ -5541,7 +5539,7 @@
             <a:pPr rtl="0"/>
             <a:fld id="{93129E9A-D0B6-40F7-8A0A-939AD4DB4DC2}" type="datetime1">
               <a:rPr lang="sk-SK" smtClean="0"/>
-              <a:t>5. 5. 2023</a:t>
+              <a:t>12. 5. 2023</a:t>
             </a:fld>
             <a:endParaRPr lang="en-US" dirty="0"/>
           </a:p>
@@ -5853,7 +5851,7 @@
             <a:pPr rtl="0"/>
             <a:fld id="{91B774FA-0FE4-4214-AF40-93987228DEF9}" type="datetime1">
               <a:rPr lang="sk-SK" smtClean="0"/>
-              <a:t>5. 5. 2023</a:t>
+              <a:t>12. 5. 2023</a:t>
             </a:fld>
             <a:endParaRPr lang="en-US" dirty="0"/>
           </a:p>
@@ -6091,7 +6089,7 @@
             <a:pPr rtl="0"/>
             <a:fld id="{9AEF3B21-A199-4423-B3FE-13E3748D99A5}" type="datetime1">
               <a:rPr lang="sk-SK" smtClean="0"/>
-              <a:t>5. 5. 2023</a:t>
+              <a:t>12. 5. 2023</a:t>
             </a:fld>
             <a:endParaRPr lang="en-US" dirty="0"/>
           </a:p>
@@ -6936,7 +6934,7 @@
           <p:cNvPr id="2" name="Nadpis 1">
             <a:extLst>
               <a:ext uri="{FF2B5EF4-FFF2-40B4-BE49-F238E27FC236}">
-                <a16:creationId xmlns:a16="http://schemas.microsoft.com/office/drawing/2014/main" id="{001CCC6D-63DC-11EA-D222-AFB2C93AF3CA}"/>
+                <a16:creationId xmlns:a16="http://schemas.microsoft.com/office/drawing/2014/main" id="{083B8333-2CDE-1E5C-54F5-BDF34DF7A84C}"/>
               </a:ext>
             </a:extLst>
           </p:cNvPr>
@@ -6954,564 +6952,171 @@
           <a:p>
             <a:r>
               <a:rPr lang="sk-SK" dirty="0"/>
-              <a:t>Mechaniky Hry</a:t>
-            </a:r>
-          </a:p>
-        </p:txBody>
-      </p:sp>
-      <p:grpSp>
-        <p:nvGrpSpPr>
-          <p:cNvPr id="9" name="Skupina 8">
+              <a:t>Rozdelenie úloh</a:t>
+            </a:r>
+          </a:p>
+        </p:txBody>
+      </p:sp>
+      <p:sp>
+        <p:nvSpPr>
+          <p:cNvPr id="3" name="Zástupný text 2">
             <a:extLst>
               <a:ext uri="{FF2B5EF4-FFF2-40B4-BE49-F238E27FC236}">
-                <a16:creationId xmlns:a16="http://schemas.microsoft.com/office/drawing/2014/main" id="{5D9B5014-7923-4323-6282-49B8E40FB1DE}"/>
+                <a16:creationId xmlns:a16="http://schemas.microsoft.com/office/drawing/2014/main" id="{A932D3E5-37D0-106E-9408-4408FEDA9D2B}"/>
               </a:ext>
             </a:extLst>
           </p:cNvPr>
-          <p:cNvGrpSpPr/>
-          <p:nvPr/>
-        </p:nvGrpSpPr>
-        <p:grpSpPr>
-          <a:xfrm>
-            <a:off x="926148" y="2189349"/>
-            <a:ext cx="3275967" cy="3714750"/>
-            <a:chOff x="808" y="0"/>
-            <a:chExt cx="3275967" cy="3714750"/>
-          </a:xfrm>
-        </p:grpSpPr>
-        <p:sp>
-          <p:nvSpPr>
-            <p:cNvPr id="16" name="Obdĺžnik 15">
-              <a:extLst>
-                <a:ext uri="{FF2B5EF4-FFF2-40B4-BE49-F238E27FC236}">
-                  <a16:creationId xmlns:a16="http://schemas.microsoft.com/office/drawing/2014/main" id="{E57607C6-1B92-698F-D8B5-0D9FF03EBCF6}"/>
-                </a:ext>
-              </a:extLst>
-            </p:cNvPr>
-            <p:cNvSpPr/>
-            <p:nvPr/>
-          </p:nvSpPr>
-          <p:spPr>
-            <a:xfrm>
-              <a:off x="808" y="0"/>
-              <a:ext cx="3275967" cy="3714750"/>
-            </a:xfrm>
-            <a:prstGeom prst="rect">
-              <a:avLst/>
-            </a:prstGeom>
-          </p:spPr>
-          <p:style>
-            <a:lnRef idx="2">
-              <a:schemeClr val="accent2">
-                <a:hueOff val="0"/>
-                <a:satOff val="0"/>
-                <a:lumOff val="0"/>
-                <a:alphaOff val="0"/>
-              </a:schemeClr>
-            </a:lnRef>
-            <a:fillRef idx="1">
-              <a:schemeClr val="accent2">
-                <a:hueOff val="0"/>
-                <a:satOff val="0"/>
-                <a:lumOff val="0"/>
-                <a:alphaOff val="0"/>
-              </a:schemeClr>
-            </a:fillRef>
-            <a:effectRef idx="0">
-              <a:schemeClr val="accent2">
-                <a:hueOff val="0"/>
-                <a:satOff val="0"/>
-                <a:lumOff val="0"/>
-                <a:alphaOff val="0"/>
-              </a:schemeClr>
-            </a:effectRef>
-            <a:fontRef idx="minor">
-              <a:schemeClr val="lt1"/>
-            </a:fontRef>
-          </p:style>
-        </p:sp>
-        <p:sp>
-          <p:nvSpPr>
-            <p:cNvPr id="17" name="BlokTextu 16">
-              <a:extLst>
-                <a:ext uri="{FF2B5EF4-FFF2-40B4-BE49-F238E27FC236}">
-                  <a16:creationId xmlns:a16="http://schemas.microsoft.com/office/drawing/2014/main" id="{2ADDC784-0A17-8198-A98F-EB2CC2F7301D}"/>
-                </a:ext>
-              </a:extLst>
-            </p:cNvPr>
-            <p:cNvSpPr txBox="1"/>
-            <p:nvPr/>
-          </p:nvSpPr>
-          <p:spPr>
-            <a:xfrm>
-              <a:off x="808" y="1041654"/>
-              <a:ext cx="3275967" cy="2228850"/>
-            </a:xfrm>
-            <a:prstGeom prst="rect">
-              <a:avLst/>
-            </a:prstGeom>
-          </p:spPr>
-          <p:style>
-            <a:lnRef idx="0">
-              <a:scrgbClr r="0" g="0" b="0"/>
-            </a:lnRef>
-            <a:fillRef idx="0">
-              <a:scrgbClr r="0" g="0" b="0"/>
-            </a:fillRef>
-            <a:effectRef idx="0">
-              <a:scrgbClr r="0" g="0" b="0"/>
-            </a:effectRef>
-            <a:fontRef idx="minor">
-              <a:schemeClr val="lt1"/>
-            </a:fontRef>
-          </p:style>
-          <p:txBody>
-            <a:bodyPr spcFirstLastPara="0" vert="horz" wrap="square" lIns="323593" tIns="0" rIns="323593" bIns="330200" numCol="1" spcCol="1270" rtlCol="0" anchor="t" anchorCtr="0">
-              <a:noAutofit/>
-            </a:bodyPr>
-            <a:lstStyle/>
-            <a:p>
-              <a:pPr marL="0" lvl="0" indent="0" algn="ctr" defTabSz="933450" rtl="0">
-                <a:lnSpc>
-                  <a:spcPct val="90000"/>
-                </a:lnSpc>
-                <a:spcBef>
-                  <a:spcPct val="0"/>
-                </a:spcBef>
-                <a:spcAft>
-                  <a:spcPct val="35000"/>
-                </a:spcAft>
-                <a:buNone/>
-                <a:defRPr cap="all"/>
-              </a:pPr>
-              <a:r>
-                <a:rPr lang="sk-SK" sz="2100" kern="1200" dirty="0" err="1"/>
-                <a:t>Explore</a:t>
-              </a:r>
-              <a:r>
-                <a:rPr lang="sk-SK" sz="2100" kern="1200" dirty="0"/>
-                <a:t>, level </a:t>
-              </a:r>
-              <a:r>
-                <a:rPr lang="sk-SK" sz="2100" kern="1200" dirty="0" err="1"/>
-                <a:t>up</a:t>
-              </a:r>
-              <a:r>
-                <a:rPr lang="sk-SK" sz="2100" dirty="0"/>
-                <a:t>, </a:t>
-              </a:r>
-              <a:r>
-                <a:rPr lang="sk-SK" sz="2100" dirty="0" err="1"/>
-                <a:t>fight</a:t>
-              </a:r>
-              <a:endParaRPr lang="sk" sz="2100" kern="1200" dirty="0"/>
-            </a:p>
-          </p:txBody>
-        </p:sp>
-      </p:grpSp>
-      <p:grpSp>
-        <p:nvGrpSpPr>
-          <p:cNvPr id="10" name="Skupina 9">
+          <p:cNvSpPr>
+            <a:spLocks noGrp="1"/>
+          </p:cNvSpPr>
+          <p:nvPr>
+            <p:ph type="body" idx="1"/>
+          </p:nvPr>
+        </p:nvSpPr>
+        <p:spPr/>
+        <p:txBody>
+          <a:bodyPr/>
+          <a:lstStyle/>
+          <a:p>
+            <a:r>
+              <a:rPr lang="sk-SK" dirty="0"/>
+              <a:t>Simon</a:t>
+            </a:r>
+          </a:p>
+        </p:txBody>
+      </p:sp>
+      <p:sp>
+        <p:nvSpPr>
+          <p:cNvPr id="4" name="Zástupný objekt pre obsah 3">
             <a:extLst>
               <a:ext uri="{FF2B5EF4-FFF2-40B4-BE49-F238E27FC236}">
-                <a16:creationId xmlns:a16="http://schemas.microsoft.com/office/drawing/2014/main" id="{4F1305A4-3966-952B-2145-52EDF044F876}"/>
+                <a16:creationId xmlns:a16="http://schemas.microsoft.com/office/drawing/2014/main" id="{41597299-158A-7C2F-7066-8C603EAC2E47}"/>
               </a:ext>
             </a:extLst>
           </p:cNvPr>
-          <p:cNvGrpSpPr/>
-          <p:nvPr/>
-        </p:nvGrpSpPr>
-        <p:grpSpPr>
-          <a:xfrm>
-            <a:off x="4402767" y="2189349"/>
-            <a:ext cx="3275969" cy="3714750"/>
-            <a:chOff x="3480113" y="0"/>
-            <a:chExt cx="3275969" cy="3714750"/>
-          </a:xfrm>
-        </p:grpSpPr>
-        <p:sp>
-          <p:nvSpPr>
-            <p:cNvPr id="14" name="Obdĺžnik 13">
-              <a:extLst>
-                <a:ext uri="{FF2B5EF4-FFF2-40B4-BE49-F238E27FC236}">
-                  <a16:creationId xmlns:a16="http://schemas.microsoft.com/office/drawing/2014/main" id="{F8811589-29DD-008D-01B2-C90A2D21FD06}"/>
-                </a:ext>
-              </a:extLst>
-            </p:cNvPr>
-            <p:cNvSpPr/>
-            <p:nvPr/>
-          </p:nvSpPr>
-          <p:spPr>
-            <a:xfrm>
-              <a:off x="3480115" y="0"/>
-              <a:ext cx="3275967" cy="3714750"/>
-            </a:xfrm>
-            <a:prstGeom prst="rect">
-              <a:avLst/>
-            </a:prstGeom>
-          </p:spPr>
-          <p:style>
-            <a:lnRef idx="2">
-              <a:schemeClr val="accent3">
-                <a:hueOff val="0"/>
-                <a:satOff val="0"/>
-                <a:lumOff val="0"/>
-                <a:alphaOff val="0"/>
-              </a:schemeClr>
-            </a:lnRef>
-            <a:fillRef idx="1">
-              <a:schemeClr val="accent3">
-                <a:hueOff val="0"/>
-                <a:satOff val="0"/>
-                <a:lumOff val="0"/>
-                <a:alphaOff val="0"/>
-              </a:schemeClr>
-            </a:fillRef>
-            <a:effectRef idx="0">
-              <a:schemeClr val="accent3">
-                <a:hueOff val="0"/>
-                <a:satOff val="0"/>
-                <a:lumOff val="0"/>
-                <a:alphaOff val="0"/>
-              </a:schemeClr>
-            </a:effectRef>
-            <a:fontRef idx="minor">
-              <a:schemeClr val="lt1"/>
-            </a:fontRef>
-          </p:style>
-        </p:sp>
-        <p:sp>
-          <p:nvSpPr>
-            <p:cNvPr id="15" name="BlokTextu 14">
-              <a:extLst>
-                <a:ext uri="{FF2B5EF4-FFF2-40B4-BE49-F238E27FC236}">
-                  <a16:creationId xmlns:a16="http://schemas.microsoft.com/office/drawing/2014/main" id="{4A319457-CBD4-ECB3-F9AC-D27FF2A820F8}"/>
-                </a:ext>
-              </a:extLst>
-            </p:cNvPr>
-            <p:cNvSpPr txBox="1"/>
-            <p:nvPr/>
-          </p:nvSpPr>
-          <p:spPr>
-            <a:xfrm>
-              <a:off x="3480113" y="1041654"/>
-              <a:ext cx="3275967" cy="2228850"/>
-            </a:xfrm>
-            <a:prstGeom prst="rect">
-              <a:avLst/>
-            </a:prstGeom>
-          </p:spPr>
-          <p:style>
-            <a:lnRef idx="0">
-              <a:scrgbClr r="0" g="0" b="0"/>
-            </a:lnRef>
-            <a:fillRef idx="0">
-              <a:scrgbClr r="0" g="0" b="0"/>
-            </a:fillRef>
-            <a:effectRef idx="0">
-              <a:scrgbClr r="0" g="0" b="0"/>
-            </a:effectRef>
-            <a:fontRef idx="minor">
-              <a:schemeClr val="lt1"/>
-            </a:fontRef>
-          </p:style>
-          <p:txBody>
-            <a:bodyPr spcFirstLastPara="0" vert="horz" wrap="square" lIns="323593" tIns="0" rIns="323593" bIns="330200" numCol="1" spcCol="1270" rtlCol="0" anchor="t" anchorCtr="0">
-              <a:noAutofit/>
-            </a:bodyPr>
-            <a:lstStyle/>
-            <a:p>
-              <a:pPr marL="0" lvl="0" indent="0" algn="ctr" defTabSz="933450" rtl="0">
-                <a:lnSpc>
-                  <a:spcPct val="90000"/>
-                </a:lnSpc>
-                <a:spcBef>
-                  <a:spcPct val="0"/>
-                </a:spcBef>
-                <a:spcAft>
-                  <a:spcPct val="35000"/>
-                </a:spcAft>
-                <a:buNone/>
-                <a:defRPr cap="all"/>
-              </a:pPr>
-              <a:r>
-                <a:rPr lang="sk" sz="2100" kern="1200" dirty="0"/>
-                <a:t>Turn based</a:t>
-              </a:r>
-            </a:p>
-            <a:p>
-              <a:pPr marL="0" lvl="0" indent="0" algn="ctr" defTabSz="933450" rtl="0">
-                <a:lnSpc>
-                  <a:spcPct val="90000"/>
-                </a:lnSpc>
-                <a:spcBef>
-                  <a:spcPct val="0"/>
-                </a:spcBef>
-                <a:spcAft>
-                  <a:spcPct val="35000"/>
-                </a:spcAft>
-                <a:buNone/>
-                <a:defRPr cap="all"/>
-              </a:pPr>
-              <a:r>
-                <a:rPr lang="sk-SK" sz="2100" dirty="0"/>
-                <a:t>I</a:t>
-              </a:r>
-              <a:r>
-                <a:rPr lang="sk" sz="2100" dirty="0"/>
-                <a:t>nspired by Final fantasy VII</a:t>
-              </a:r>
-              <a:endParaRPr lang="sk" sz="2100" kern="1200" dirty="0"/>
-            </a:p>
-          </p:txBody>
-        </p:sp>
-      </p:grpSp>
-      <p:grpSp>
-        <p:nvGrpSpPr>
-          <p:cNvPr id="11" name="Skupina 10">
+          <p:cNvSpPr>
+            <a:spLocks noGrp="1"/>
+          </p:cNvSpPr>
+          <p:nvPr>
+            <p:ph sz="half" idx="2"/>
+          </p:nvPr>
+        </p:nvSpPr>
+        <p:spPr/>
+        <p:txBody>
+          <a:bodyPr/>
+          <a:lstStyle/>
+          <a:p>
+            <a:r>
+              <a:rPr lang="sk-SK" dirty="0"/>
+              <a:t>- Pohyb </a:t>
+            </a:r>
+            <a:r>
+              <a:rPr lang="sk-SK" dirty="0" err="1"/>
+              <a:t>playera</a:t>
+            </a:r>
+            <a:endParaRPr lang="sk-SK" dirty="0"/>
+          </a:p>
+          <a:p>
+            <a:r>
+              <a:rPr lang="sk-SK" dirty="0"/>
+              <a:t>-prepojenie main.py s level1.py</a:t>
+            </a:r>
+          </a:p>
+          <a:p>
+            <a:endParaRPr lang="sk-SK" dirty="0"/>
+          </a:p>
+        </p:txBody>
+      </p:sp>
+      <p:sp>
+        <p:nvSpPr>
+          <p:cNvPr id="5" name="Zástupný text 4">
             <a:extLst>
               <a:ext uri="{FF2B5EF4-FFF2-40B4-BE49-F238E27FC236}">
-                <a16:creationId xmlns:a16="http://schemas.microsoft.com/office/drawing/2014/main" id="{F351BB63-CF50-619E-66E8-F1012C82E316}"/>
+                <a16:creationId xmlns:a16="http://schemas.microsoft.com/office/drawing/2014/main" id="{B308C857-6CA2-AA6D-1662-D7E9847132DA}"/>
               </a:ext>
             </a:extLst>
           </p:cNvPr>
-          <p:cNvGrpSpPr/>
-          <p:nvPr/>
-        </p:nvGrpSpPr>
-        <p:grpSpPr>
-          <a:xfrm>
-            <a:off x="7989885" y="2189349"/>
-            <a:ext cx="3288320" cy="3714750"/>
-            <a:chOff x="7064545" y="0"/>
-            <a:chExt cx="3288320" cy="3714750"/>
-          </a:xfrm>
-        </p:grpSpPr>
-        <p:sp>
-          <p:nvSpPr>
-            <p:cNvPr id="12" name="Obdĺžnik 11">
-              <a:extLst>
-                <a:ext uri="{FF2B5EF4-FFF2-40B4-BE49-F238E27FC236}">
-                  <a16:creationId xmlns:a16="http://schemas.microsoft.com/office/drawing/2014/main" id="{6FC2F641-87DE-95D7-C76F-A5DF8282E861}"/>
-                </a:ext>
-              </a:extLst>
-            </p:cNvPr>
-            <p:cNvSpPr/>
-            <p:nvPr/>
-          </p:nvSpPr>
-          <p:spPr>
-            <a:xfrm>
-              <a:off x="7076898" y="0"/>
-              <a:ext cx="3275967" cy="3714750"/>
-            </a:xfrm>
-            <a:prstGeom prst="rect">
-              <a:avLst/>
-            </a:prstGeom>
-          </p:spPr>
-          <p:style>
-            <a:lnRef idx="2">
-              <a:schemeClr val="accent4">
-                <a:hueOff val="0"/>
-                <a:satOff val="0"/>
-                <a:lumOff val="0"/>
-                <a:alphaOff val="0"/>
-              </a:schemeClr>
-            </a:lnRef>
-            <a:fillRef idx="1">
-              <a:schemeClr val="accent4">
-                <a:hueOff val="0"/>
-                <a:satOff val="0"/>
-                <a:lumOff val="0"/>
-                <a:alphaOff val="0"/>
-              </a:schemeClr>
-            </a:fillRef>
-            <a:effectRef idx="0">
-              <a:schemeClr val="accent4">
-                <a:hueOff val="0"/>
-                <a:satOff val="0"/>
-                <a:lumOff val="0"/>
-                <a:alphaOff val="0"/>
-              </a:schemeClr>
-            </a:effectRef>
-            <a:fontRef idx="minor">
-              <a:schemeClr val="lt1"/>
-            </a:fontRef>
-          </p:style>
-        </p:sp>
-        <p:sp>
-          <p:nvSpPr>
-            <p:cNvPr id="13" name="BlokTextu 12">
-              <a:extLst>
-                <a:ext uri="{FF2B5EF4-FFF2-40B4-BE49-F238E27FC236}">
-                  <a16:creationId xmlns:a16="http://schemas.microsoft.com/office/drawing/2014/main" id="{A9F48028-9A03-202E-FD65-885A1648F581}"/>
-                </a:ext>
-              </a:extLst>
-            </p:cNvPr>
-            <p:cNvSpPr txBox="1"/>
-            <p:nvPr/>
-          </p:nvSpPr>
-          <p:spPr>
-            <a:xfrm>
-              <a:off x="7064545" y="1039125"/>
-              <a:ext cx="3275967" cy="2228850"/>
-            </a:xfrm>
-            <a:prstGeom prst="rect">
-              <a:avLst/>
-            </a:prstGeom>
-          </p:spPr>
-          <p:style>
-            <a:lnRef idx="0">
-              <a:scrgbClr r="0" g="0" b="0"/>
-            </a:lnRef>
-            <a:fillRef idx="0">
-              <a:scrgbClr r="0" g="0" b="0"/>
-            </a:fillRef>
-            <a:effectRef idx="0">
-              <a:scrgbClr r="0" g="0" b="0"/>
-            </a:effectRef>
-            <a:fontRef idx="minor">
-              <a:schemeClr val="lt1"/>
-            </a:fontRef>
-          </p:style>
-          <p:txBody>
-            <a:bodyPr spcFirstLastPara="0" vert="horz" wrap="square" lIns="323593" tIns="0" rIns="323593" bIns="330200" numCol="1" spcCol="1270" rtlCol="0" anchor="t" anchorCtr="0">
-              <a:noAutofit/>
-            </a:bodyPr>
-            <a:lstStyle/>
-            <a:p>
-              <a:pPr marL="0" lvl="0" indent="0" algn="ctr" defTabSz="933450" rtl="0">
-                <a:lnSpc>
-                  <a:spcPct val="90000"/>
-                </a:lnSpc>
-                <a:spcBef>
-                  <a:spcPct val="0"/>
-                </a:spcBef>
-                <a:spcAft>
-                  <a:spcPct val="35000"/>
-                </a:spcAft>
-                <a:buNone/>
-                <a:defRPr cap="all"/>
-              </a:pPr>
-              <a:r>
-                <a:rPr lang="sk" sz="2100" dirty="0"/>
-                <a:t>IDK</a:t>
-              </a:r>
-              <a:endParaRPr lang="sk" sz="2100" kern="1200" dirty="0"/>
-            </a:p>
-          </p:txBody>
-        </p:sp>
-      </p:grpSp>
-      <p:sp>
-        <p:nvSpPr>
-          <p:cNvPr id="18" name="BlokTextu 17">
+          <p:cNvSpPr>
+            <a:spLocks noGrp="1"/>
+          </p:cNvSpPr>
+          <p:nvPr>
+            <p:ph type="body" sz="quarter" idx="3"/>
+          </p:nvPr>
+        </p:nvSpPr>
+        <p:spPr/>
+        <p:txBody>
+          <a:bodyPr/>
+          <a:lstStyle/>
+          <a:p>
+            <a:r>
+              <a:rPr lang="sk-SK" dirty="0"/>
+              <a:t>Samo</a:t>
+            </a:r>
+          </a:p>
+        </p:txBody>
+      </p:sp>
+      <p:sp>
+        <p:nvSpPr>
+          <p:cNvPr id="6" name="Zástupný objekt pre obsah 5">
             <a:extLst>
               <a:ext uri="{FF2B5EF4-FFF2-40B4-BE49-F238E27FC236}">
-                <a16:creationId xmlns:a16="http://schemas.microsoft.com/office/drawing/2014/main" id="{D2CA3755-005D-64CA-1118-5B662F4B581C}"/>
+                <a16:creationId xmlns:a16="http://schemas.microsoft.com/office/drawing/2014/main" id="{86874412-80D1-35C7-539E-FA42C022FFA1}"/>
               </a:ext>
             </a:extLst>
           </p:cNvPr>
-          <p:cNvSpPr txBox="1"/>
-          <p:nvPr/>
-        </p:nvSpPr>
-        <p:spPr>
-          <a:xfrm>
-            <a:off x="1179947" y="2417425"/>
-            <a:ext cx="2768367" cy="369332"/>
-          </a:xfrm>
-          <a:prstGeom prst="rect">
-            <a:avLst/>
-          </a:prstGeom>
-          <a:noFill/>
-        </p:spPr>
-        <p:txBody>
-          <a:bodyPr wrap="square" rtlCol="0">
-            <a:spAutoFit/>
-          </a:bodyPr>
+          <p:cNvSpPr>
+            <a:spLocks noGrp="1"/>
+          </p:cNvSpPr>
+          <p:nvPr>
+            <p:ph sz="quarter" idx="4"/>
+          </p:nvPr>
+        </p:nvSpPr>
+        <p:spPr/>
+        <p:txBody>
+          <a:bodyPr/>
           <a:lstStyle/>
           <a:p>
-            <a:pPr algn="ctr"/>
             <a:r>
               <a:rPr lang="sk-SK" dirty="0"/>
-              <a:t>GAMEPLAY</a:t>
-            </a:r>
-          </a:p>
-        </p:txBody>
-      </p:sp>
-      <p:sp>
-        <p:nvSpPr>
-          <p:cNvPr id="20" name="BlokTextu 19">
+              <a:t>- nakreslená mapa</a:t>
+            </a:r>
+          </a:p>
+        </p:txBody>
+      </p:sp>
+      <p:sp>
+        <p:nvSpPr>
+          <p:cNvPr id="7" name="Zástupný objekt pre dátum 6">
             <a:extLst>
               <a:ext uri="{FF2B5EF4-FFF2-40B4-BE49-F238E27FC236}">
-                <a16:creationId xmlns:a16="http://schemas.microsoft.com/office/drawing/2014/main" id="{73E4F570-AFEA-6766-4447-9A2F02B69C1B}"/>
+                <a16:creationId xmlns:a16="http://schemas.microsoft.com/office/drawing/2014/main" id="{4071AD04-9224-CF36-8C1A-6B2F37C288E9}"/>
               </a:ext>
             </a:extLst>
           </p:cNvPr>
-          <p:cNvSpPr txBox="1"/>
-          <p:nvPr/>
-        </p:nvSpPr>
-        <p:spPr>
-          <a:xfrm>
-            <a:off x="4656568" y="2417425"/>
-            <a:ext cx="2768367" cy="369332"/>
-          </a:xfrm>
-          <a:prstGeom prst="rect">
-            <a:avLst/>
-          </a:prstGeom>
-          <a:noFill/>
-        </p:spPr>
-        <p:txBody>
-          <a:bodyPr wrap="square" rtlCol="0">
-            <a:spAutoFit/>
-          </a:bodyPr>
+          <p:cNvSpPr>
+            <a:spLocks noGrp="1"/>
+          </p:cNvSpPr>
+          <p:nvPr>
+            <p:ph type="dt" sz="half" idx="10"/>
+          </p:nvPr>
+        </p:nvSpPr>
+        <p:spPr/>
+        <p:txBody>
+          <a:bodyPr/>
           <a:lstStyle/>
           <a:p>
-            <a:pPr algn="ctr"/>
-            <a:r>
-              <a:rPr lang="sk-SK" dirty="0"/>
-              <a:t>FIGHT STYLE</a:t>
-            </a:r>
-          </a:p>
-        </p:txBody>
-      </p:sp>
-      <p:sp>
-        <p:nvSpPr>
-          <p:cNvPr id="21" name="BlokTextu 20">
-            <a:extLst>
-              <a:ext uri="{FF2B5EF4-FFF2-40B4-BE49-F238E27FC236}">
-                <a16:creationId xmlns:a16="http://schemas.microsoft.com/office/drawing/2014/main" id="{96BA24DF-52B3-5A49-72CD-B161F361E620}"/>
-              </a:ext>
-            </a:extLst>
-          </p:cNvPr>
-          <p:cNvSpPr txBox="1"/>
-          <p:nvPr/>
-        </p:nvSpPr>
-        <p:spPr>
-          <a:xfrm>
-            <a:off x="8243686" y="2412368"/>
-            <a:ext cx="2768367" cy="369332"/>
-          </a:xfrm>
-          <a:prstGeom prst="rect">
-            <a:avLst/>
-          </a:prstGeom>
-          <a:noFill/>
-        </p:spPr>
-        <p:txBody>
-          <a:bodyPr wrap="square" rtlCol="0">
-            <a:spAutoFit/>
-          </a:bodyPr>
-          <a:lstStyle/>
-          <a:p>
-            <a:pPr algn="ctr"/>
-            <a:r>
-              <a:rPr lang="sk-SK" dirty="0"/>
-              <a:t>STORY</a:t>
-            </a:r>
+            <a:pPr rtl="0"/>
+            <a:fld id="{6E99163E-FC86-4DD8-A6C9-05392E4121F2}" type="datetime1">
+              <a:rPr lang="sk-SK" smtClean="0"/>
+              <a:t>12. 5. 2023</a:t>
+            </a:fld>
+            <a:endParaRPr lang="en-US" dirty="0"/>
           </a:p>
         </p:txBody>
       </p:sp>
     </p:spTree>
     <p:extLst>
       <p:ext uri="{BB962C8B-B14F-4D97-AF65-F5344CB8AC3E}">
-        <p14:creationId xmlns:p14="http://schemas.microsoft.com/office/powerpoint/2010/main" val="3559282489"/>
+        <p14:creationId xmlns:p14="http://schemas.microsoft.com/office/powerpoint/2010/main" val="1042405687"/>
       </p:ext>
     </p:extLst>
   </p:cSld>
@@ -7543,217 +7148,6 @@
           <p:cNvPr id="2" name="Nadpis 1">
             <a:extLst>
               <a:ext uri="{FF2B5EF4-FFF2-40B4-BE49-F238E27FC236}">
-                <a16:creationId xmlns:a16="http://schemas.microsoft.com/office/drawing/2014/main" id="{083B8333-2CDE-1E5C-54F5-BDF34DF7A84C}"/>
-              </a:ext>
-            </a:extLst>
-          </p:cNvPr>
-          <p:cNvSpPr>
-            <a:spLocks noGrp="1"/>
-          </p:cNvSpPr>
-          <p:nvPr>
-            <p:ph type="title"/>
-          </p:nvPr>
-        </p:nvSpPr>
-        <p:spPr/>
-        <p:txBody>
-          <a:bodyPr/>
-          <a:lstStyle/>
-          <a:p>
-            <a:r>
-              <a:rPr lang="sk-SK" dirty="0"/>
-              <a:t>Rozdelenie úloh</a:t>
-            </a:r>
-          </a:p>
-        </p:txBody>
-      </p:sp>
-      <p:sp>
-        <p:nvSpPr>
-          <p:cNvPr id="3" name="Zástupný text 2">
-            <a:extLst>
-              <a:ext uri="{FF2B5EF4-FFF2-40B4-BE49-F238E27FC236}">
-                <a16:creationId xmlns:a16="http://schemas.microsoft.com/office/drawing/2014/main" id="{A932D3E5-37D0-106E-9408-4408FEDA9D2B}"/>
-              </a:ext>
-            </a:extLst>
-          </p:cNvPr>
-          <p:cNvSpPr>
-            <a:spLocks noGrp="1"/>
-          </p:cNvSpPr>
-          <p:nvPr>
-            <p:ph type="body" idx="1"/>
-          </p:nvPr>
-        </p:nvSpPr>
-        <p:spPr/>
-        <p:txBody>
-          <a:bodyPr/>
-          <a:lstStyle/>
-          <a:p>
-            <a:r>
-              <a:rPr lang="sk-SK" dirty="0"/>
-              <a:t>Simon</a:t>
-            </a:r>
-          </a:p>
-        </p:txBody>
-      </p:sp>
-      <p:sp>
-        <p:nvSpPr>
-          <p:cNvPr id="4" name="Zástupný objekt pre obsah 3">
-            <a:extLst>
-              <a:ext uri="{FF2B5EF4-FFF2-40B4-BE49-F238E27FC236}">
-                <a16:creationId xmlns:a16="http://schemas.microsoft.com/office/drawing/2014/main" id="{41597299-158A-7C2F-7066-8C603EAC2E47}"/>
-              </a:ext>
-            </a:extLst>
-          </p:cNvPr>
-          <p:cNvSpPr>
-            <a:spLocks noGrp="1"/>
-          </p:cNvSpPr>
-          <p:nvPr>
-            <p:ph sz="half" idx="2"/>
-          </p:nvPr>
-        </p:nvSpPr>
-        <p:spPr/>
-        <p:txBody>
-          <a:bodyPr/>
-          <a:lstStyle/>
-          <a:p>
-            <a:r>
-              <a:rPr lang="sk-SK" dirty="0"/>
-              <a:t>- Táto prezentácia</a:t>
-            </a:r>
-          </a:p>
-          <a:p>
-            <a:r>
-              <a:rPr lang="sk-SK" dirty="0"/>
-              <a:t>-Nastavenie Gitu/</a:t>
-            </a:r>
-            <a:r>
-              <a:rPr lang="sk-SK" dirty="0" err="1"/>
-              <a:t>Githubu</a:t>
-            </a:r>
-            <a:endParaRPr lang="sk-SK" dirty="0"/>
-          </a:p>
-        </p:txBody>
-      </p:sp>
-      <p:sp>
-        <p:nvSpPr>
-          <p:cNvPr id="5" name="Zástupný text 4">
-            <a:extLst>
-              <a:ext uri="{FF2B5EF4-FFF2-40B4-BE49-F238E27FC236}">
-                <a16:creationId xmlns:a16="http://schemas.microsoft.com/office/drawing/2014/main" id="{B308C857-6CA2-AA6D-1662-D7E9847132DA}"/>
-              </a:ext>
-            </a:extLst>
-          </p:cNvPr>
-          <p:cNvSpPr>
-            <a:spLocks noGrp="1"/>
-          </p:cNvSpPr>
-          <p:nvPr>
-            <p:ph type="body" sz="quarter" idx="3"/>
-          </p:nvPr>
-        </p:nvSpPr>
-        <p:spPr/>
-        <p:txBody>
-          <a:bodyPr/>
-          <a:lstStyle/>
-          <a:p>
-            <a:r>
-              <a:rPr lang="sk-SK" dirty="0"/>
-              <a:t>Samo</a:t>
-            </a:r>
-          </a:p>
-        </p:txBody>
-      </p:sp>
-      <p:sp>
-        <p:nvSpPr>
-          <p:cNvPr id="6" name="Zástupný objekt pre obsah 5">
-            <a:extLst>
-              <a:ext uri="{FF2B5EF4-FFF2-40B4-BE49-F238E27FC236}">
-                <a16:creationId xmlns:a16="http://schemas.microsoft.com/office/drawing/2014/main" id="{86874412-80D1-35C7-539E-FA42C022FFA1}"/>
-              </a:ext>
-            </a:extLst>
-          </p:cNvPr>
-          <p:cNvSpPr>
-            <a:spLocks noGrp="1"/>
-          </p:cNvSpPr>
-          <p:nvPr>
-            <p:ph sz="quarter" idx="4"/>
-          </p:nvPr>
-        </p:nvSpPr>
-        <p:spPr/>
-        <p:txBody>
-          <a:bodyPr/>
-          <a:lstStyle/>
-          <a:p>
-            <a:r>
-              <a:rPr lang="sk-SK" dirty="0"/>
-              <a:t>- Menu </a:t>
-            </a:r>
-          </a:p>
-        </p:txBody>
-      </p:sp>
-      <p:sp>
-        <p:nvSpPr>
-          <p:cNvPr id="7" name="Zástupný objekt pre dátum 6">
-            <a:extLst>
-              <a:ext uri="{FF2B5EF4-FFF2-40B4-BE49-F238E27FC236}">
-                <a16:creationId xmlns:a16="http://schemas.microsoft.com/office/drawing/2014/main" id="{4071AD04-9224-CF36-8C1A-6B2F37C288E9}"/>
-              </a:ext>
-            </a:extLst>
-          </p:cNvPr>
-          <p:cNvSpPr>
-            <a:spLocks noGrp="1"/>
-          </p:cNvSpPr>
-          <p:nvPr>
-            <p:ph type="dt" sz="half" idx="10"/>
-          </p:nvPr>
-        </p:nvSpPr>
-        <p:spPr/>
-        <p:txBody>
-          <a:bodyPr/>
-          <a:lstStyle/>
-          <a:p>
-            <a:pPr rtl="0"/>
-            <a:fld id="{6E99163E-FC86-4DD8-A6C9-05392E4121F2}" type="datetime1">
-              <a:rPr lang="sk-SK" smtClean="0"/>
-              <a:t>5. 5. 2023</a:t>
-            </a:fld>
-            <a:endParaRPr lang="en-US" dirty="0"/>
-          </a:p>
-        </p:txBody>
-      </p:sp>
-    </p:spTree>
-    <p:extLst>
-      <p:ext uri="{BB962C8B-B14F-4D97-AF65-F5344CB8AC3E}">
-        <p14:creationId xmlns:p14="http://schemas.microsoft.com/office/powerpoint/2010/main" val="1042405687"/>
-      </p:ext>
-    </p:extLst>
-  </p:cSld>
-  <p:clrMapOvr>
-    <a:masterClrMapping/>
-  </p:clrMapOvr>
-</p:sld>
-</file>
-
-<file path=ppt/slides/slide4.xml><?xml version="1.0" encoding="utf-8"?>
-<p:sld xmlns:a="http://schemas.openxmlformats.org/drawingml/2006/main" xmlns:r="http://schemas.openxmlformats.org/officeDocument/2006/relationships" xmlns:p="http://schemas.openxmlformats.org/presentationml/2006/main">
-  <p:cSld>
-    <p:spTree>
-      <p:nvGrpSpPr>
-        <p:cNvPr id="1" name=""/>
-        <p:cNvGrpSpPr/>
-        <p:nvPr/>
-      </p:nvGrpSpPr>
-      <p:grpSpPr>
-        <a:xfrm>
-          <a:off x="0" y="0"/>
-          <a:ext cx="0" cy="0"/>
-          <a:chOff x="0" y="0"/>
-          <a:chExt cx="0" cy="0"/>
-        </a:xfrm>
-      </p:grpSpPr>
-      <p:sp>
-        <p:nvSpPr>
-          <p:cNvPr id="2" name="Nadpis 1">
-            <a:extLst>
-              <a:ext uri="{FF2B5EF4-FFF2-40B4-BE49-F238E27FC236}">
                 <a16:creationId xmlns:a16="http://schemas.microsoft.com/office/drawing/2014/main" id="{EE68A59E-17BF-A595-E755-72C53D8B57AA}"/>
               </a:ext>
             </a:extLst>
@@ -7772,7 +7166,7 @@
           <a:p>
             <a:r>
               <a:rPr lang="sk-SK" dirty="0"/>
-              <a:t>Čo už máme</a:t>
+              <a:t>Čo ďalej</a:t>
             </a:r>
           </a:p>
         </p:txBody>
@@ -7799,13 +7193,34 @@
           <a:lstStyle/>
           <a:p>
             <a:r>
+              <a:rPr lang="sk-SK" dirty="0" err="1"/>
+              <a:t>Enemies</a:t>
+            </a:r>
+            <a:endParaRPr lang="sk-SK" dirty="0"/>
+          </a:p>
+          <a:p>
+            <a:r>
               <a:rPr lang="sk-SK" dirty="0"/>
-              <a:t>Nefunkčný QUIT </a:t>
-            </a:r>
+              <a:t>Inventár</a:t>
+            </a:r>
+          </a:p>
+          <a:p>
             <a:r>
               <a:rPr lang="sk-SK" dirty="0" err="1"/>
-              <a:t>button</a:t>
-            </a:r>
+              <a:t>Player</a:t>
+            </a:r>
+            <a:r>
+              <a:rPr lang="sk-SK" dirty="0"/>
+              <a:t> levely</a:t>
+            </a:r>
+          </a:p>
+          <a:p>
+            <a:r>
+              <a:rPr lang="sk-SK" dirty="0"/>
+              <a:t>Vymyslieť meno hry</a:t>
+            </a:r>
+          </a:p>
+          <a:p>
             <a:endParaRPr lang="sk-SK" dirty="0"/>
           </a:p>
         </p:txBody>
@@ -7834,7 +7249,7 @@
             <a:pPr rtl="0"/>
             <a:fld id="{D3046F11-C154-4DFF-AB72-5BD2314E7A83}" type="datetime1">
               <a:rPr lang="sk-SK" smtClean="0"/>
-              <a:t>5. 5. 2023</a:t>
+              <a:t>12. 5. 2023</a:t>
             </a:fld>
             <a:endParaRPr lang="en-US" dirty="0"/>
           </a:p>
@@ -7844,123 +7259,6 @@
     <p:extLst>
       <p:ext uri="{BB962C8B-B14F-4D97-AF65-F5344CB8AC3E}">
         <p14:creationId xmlns:p14="http://schemas.microsoft.com/office/powerpoint/2010/main" val="2712333243"/>
-      </p:ext>
-    </p:extLst>
-  </p:cSld>
-  <p:clrMapOvr>
-    <a:masterClrMapping/>
-  </p:clrMapOvr>
-</p:sld>
-</file>
-
-<file path=ppt/slides/slide5.xml><?xml version="1.0" encoding="utf-8"?>
-<p:sld xmlns:a="http://schemas.openxmlformats.org/drawingml/2006/main" xmlns:r="http://schemas.openxmlformats.org/officeDocument/2006/relationships" xmlns:p="http://schemas.openxmlformats.org/presentationml/2006/main">
-  <p:cSld>
-    <p:spTree>
-      <p:nvGrpSpPr>
-        <p:cNvPr id="1" name=""/>
-        <p:cNvGrpSpPr/>
-        <p:nvPr/>
-      </p:nvGrpSpPr>
-      <p:grpSpPr>
-        <a:xfrm>
-          <a:off x="0" y="0"/>
-          <a:ext cx="0" cy="0"/>
-          <a:chOff x="0" y="0"/>
-          <a:chExt cx="0" cy="0"/>
-        </a:xfrm>
-      </p:grpSpPr>
-      <p:sp>
-        <p:nvSpPr>
-          <p:cNvPr id="2" name="Nadpis 1">
-            <a:extLst>
-              <a:ext uri="{FF2B5EF4-FFF2-40B4-BE49-F238E27FC236}">
-                <a16:creationId xmlns:a16="http://schemas.microsoft.com/office/drawing/2014/main" id="{CB60E425-FE5D-20A9-B87C-80ECE7AEA36A}"/>
-              </a:ext>
-            </a:extLst>
-          </p:cNvPr>
-          <p:cNvSpPr>
-            <a:spLocks noGrp="1"/>
-          </p:cNvSpPr>
-          <p:nvPr>
-            <p:ph type="title"/>
-          </p:nvPr>
-        </p:nvSpPr>
-        <p:spPr/>
-        <p:txBody>
-          <a:bodyPr/>
-          <a:lstStyle/>
-          <a:p>
-            <a:r>
-              <a:rPr lang="sk-SK" dirty="0"/>
-              <a:t>GITHUB</a:t>
-            </a:r>
-          </a:p>
-        </p:txBody>
-      </p:sp>
-      <p:pic>
-        <p:nvPicPr>
-          <p:cNvPr id="6" name="Zástupný objekt pre obsah 5">
-            <a:extLst>
-              <a:ext uri="{FF2B5EF4-FFF2-40B4-BE49-F238E27FC236}">
-                <a16:creationId xmlns:a16="http://schemas.microsoft.com/office/drawing/2014/main" id="{6E6ACB07-CD2B-05EC-09F9-CA5A9B6F737B}"/>
-              </a:ext>
-            </a:extLst>
-          </p:cNvPr>
-          <p:cNvPicPr>
-            <a:picLocks noGrp="1" noChangeAspect="1"/>
-          </p:cNvPicPr>
-          <p:nvPr>
-            <p:ph idx="1"/>
-          </p:nvPr>
-        </p:nvPicPr>
-        <p:blipFill>
-          <a:blip r:embed="rId2"/>
-          <a:stretch>
-            <a:fillRect/>
-          </a:stretch>
-        </p:blipFill>
-        <p:spPr>
-          <a:xfrm>
-            <a:off x="2598504" y="2076449"/>
-            <a:ext cx="6984344" cy="3714750"/>
-          </a:xfrm>
-        </p:spPr>
-      </p:pic>
-      <p:sp>
-        <p:nvSpPr>
-          <p:cNvPr id="4" name="Zástupný objekt pre dátum 3">
-            <a:extLst>
-              <a:ext uri="{FF2B5EF4-FFF2-40B4-BE49-F238E27FC236}">
-                <a16:creationId xmlns:a16="http://schemas.microsoft.com/office/drawing/2014/main" id="{64A24669-19E5-7AB6-C85C-69D154D88BFC}"/>
-              </a:ext>
-            </a:extLst>
-          </p:cNvPr>
-          <p:cNvSpPr>
-            <a:spLocks noGrp="1"/>
-          </p:cNvSpPr>
-          <p:nvPr>
-            <p:ph type="dt" sz="half" idx="10"/>
-          </p:nvPr>
-        </p:nvSpPr>
-        <p:spPr/>
-        <p:txBody>
-          <a:bodyPr/>
-          <a:lstStyle/>
-          <a:p>
-            <a:pPr rtl="0"/>
-            <a:fld id="{D3046F11-C154-4DFF-AB72-5BD2314E7A83}" type="datetime1">
-              <a:rPr lang="sk-SK" smtClean="0"/>
-              <a:t>5. 5. 2023</a:t>
-            </a:fld>
-            <a:endParaRPr lang="en-US" dirty="0"/>
-          </a:p>
-        </p:txBody>
-      </p:sp>
-    </p:spTree>
-    <p:extLst>
-      <p:ext uri="{BB962C8B-B14F-4D97-AF65-F5344CB8AC3E}">
-        <p14:creationId xmlns:p14="http://schemas.microsoft.com/office/powerpoint/2010/main" val="2039697617"/>
       </p:ext>
     </p:extLst>
   </p:cSld>

</xml_diff>